<commit_message>
update logo + style
</commit_message>
<xml_diff>
--- a/Libellule.pptx
+++ b/Libellule.pptx
@@ -6,8 +6,11 @@
   </p:sldMasterIdLst>
   <p:sldIdLst>
     <p:sldId id="256" r:id="rId2"/>
-    <p:sldId id="258" r:id="rId3"/>
-    <p:sldId id="257" r:id="rId4"/>
+    <p:sldId id="259" r:id="rId3"/>
+    <p:sldId id="260" r:id="rId4"/>
+    <p:sldId id="261" r:id="rId5"/>
+    <p:sldId id="258" r:id="rId6"/>
+    <p:sldId id="257" r:id="rId7"/>
   </p:sldIdLst>
   <p:sldSz cx="12192000" cy="6858000"/>
   <p:notesSz cx="6858000" cy="9144000"/>
@@ -168,6 +171,60 @@
 </inkml:ink>
 </file>
 
+<file path=ppt/ink/ink3.xml><?xml version="1.0" encoding="utf-8"?>
+<inkml:ink xmlns:inkml="http://www.w3.org/2003/InkML">
+  <inkml:definitions>
+    <inkml:context xml:id="ctx0">
+      <inkml:inkSource xml:id="inkSrc0">
+        <inkml:traceFormat>
+          <inkml:channel name="X" type="integer" min="-2.14748E9" max="2.14748E9" units="cm"/>
+          <inkml:channel name="Y" type="integer" min="-2.14748E9" max="2.14748E9" units="cm"/>
+          <inkml:channel name="F" type="integer" max="32767" units="dev"/>
+        </inkml:traceFormat>
+        <inkml:channelProperties>
+          <inkml:channelProperty channel="X" name="resolution" value="1000" units="1/cm"/>
+          <inkml:channelProperty channel="Y" name="resolution" value="1000" units="1/cm"/>
+          <inkml:channelProperty channel="F" name="resolution" value="0" units="1/dev"/>
+        </inkml:channelProperties>
+      </inkml:inkSource>
+      <inkml:timestamp xml:id="ts0" timeString="2025-08-29T16:25:36.130"/>
+    </inkml:context>
+    <inkml:brush xml:id="br0">
+      <inkml:brushProperty name="width" value="0.05" units="cm"/>
+      <inkml:brushProperty name="height" value="0.05" units="cm"/>
+    </inkml:brush>
+  </inkml:definitions>
+  <inkml:trace contextRef="#ctx0" brushRef="#br0">0 0 24575,'0'0'0</inkml:trace>
+</inkml:ink>
+</file>
+
+<file path=ppt/ink/ink4.xml><?xml version="1.0" encoding="utf-8"?>
+<inkml:ink xmlns:inkml="http://www.w3.org/2003/InkML">
+  <inkml:definitions>
+    <inkml:context xml:id="ctx0">
+      <inkml:inkSource xml:id="inkSrc0">
+        <inkml:traceFormat>
+          <inkml:channel name="X" type="integer" min="-2.14748E9" max="2.14748E9" units="cm"/>
+          <inkml:channel name="Y" type="integer" min="-2.14748E9" max="2.14748E9" units="cm"/>
+          <inkml:channel name="F" type="integer" max="32767" units="dev"/>
+        </inkml:traceFormat>
+        <inkml:channelProperties>
+          <inkml:channelProperty channel="X" name="resolution" value="1000" units="1/cm"/>
+          <inkml:channelProperty channel="Y" name="resolution" value="1000" units="1/cm"/>
+          <inkml:channelProperty channel="F" name="resolution" value="0" units="1/dev"/>
+        </inkml:channelProperties>
+      </inkml:inkSource>
+      <inkml:timestamp xml:id="ts0" timeString="2025-08-29T16:25:36.130"/>
+    </inkml:context>
+    <inkml:brush xml:id="br0">
+      <inkml:brushProperty name="width" value="0.05" units="cm"/>
+      <inkml:brushProperty name="height" value="0.05" units="cm"/>
+    </inkml:brush>
+  </inkml:definitions>
+  <inkml:trace contextRef="#ctx0" brushRef="#br0">0 0 24575,'0'0'0</inkml:trace>
+</inkml:ink>
+</file>
+
 <file path=ppt/slideLayouts/slideLayout1.xml><?xml version="1.0" encoding="utf-8"?>
 <p:sldLayout xmlns:a="http://schemas.openxmlformats.org/drawingml/2006/main" xmlns:r="http://schemas.openxmlformats.org/officeDocument/2006/relationships" xmlns:p="http://schemas.openxmlformats.org/presentationml/2006/main" type="title" preserve="1">
   <p:cSld name="Title Slide">
@@ -315,7 +372,7 @@
           <a:p>
             <a:fld id="{A067E4C3-9D56-154E-B9F0-7500D37D0D92}" type="datetimeFigureOut">
               <a:rPr lang="en-US" smtClean="0"/>
-              <a:t>8/30/25</a:t>
+              <a:t>8/31/25</a:t>
             </a:fld>
             <a:endParaRPr lang="en-US"/>
           </a:p>
@@ -513,7 +570,7 @@
           <a:p>
             <a:fld id="{A067E4C3-9D56-154E-B9F0-7500D37D0D92}" type="datetimeFigureOut">
               <a:rPr lang="en-US" smtClean="0"/>
-              <a:t>8/30/25</a:t>
+              <a:t>8/31/25</a:t>
             </a:fld>
             <a:endParaRPr lang="en-US"/>
           </a:p>
@@ -721,7 +778,7 @@
           <a:p>
             <a:fld id="{A067E4C3-9D56-154E-B9F0-7500D37D0D92}" type="datetimeFigureOut">
               <a:rPr lang="en-US" smtClean="0"/>
-              <a:t>8/30/25</a:t>
+              <a:t>8/31/25</a:t>
             </a:fld>
             <a:endParaRPr lang="en-US"/>
           </a:p>
@@ -919,7 +976,7 @@
           <a:p>
             <a:fld id="{A067E4C3-9D56-154E-B9F0-7500D37D0D92}" type="datetimeFigureOut">
               <a:rPr lang="en-US" smtClean="0"/>
-              <a:t>8/30/25</a:t>
+              <a:t>8/31/25</a:t>
             </a:fld>
             <a:endParaRPr lang="en-US"/>
           </a:p>
@@ -1194,7 +1251,7 @@
           <a:p>
             <a:fld id="{A067E4C3-9D56-154E-B9F0-7500D37D0D92}" type="datetimeFigureOut">
               <a:rPr lang="en-US" smtClean="0"/>
-              <a:t>8/30/25</a:t>
+              <a:t>8/31/25</a:t>
             </a:fld>
             <a:endParaRPr lang="en-US"/>
           </a:p>
@@ -1459,7 +1516,7 @@
           <a:p>
             <a:fld id="{A067E4C3-9D56-154E-B9F0-7500D37D0D92}" type="datetimeFigureOut">
               <a:rPr lang="en-US" smtClean="0"/>
-              <a:t>8/30/25</a:t>
+              <a:t>8/31/25</a:t>
             </a:fld>
             <a:endParaRPr lang="en-US"/>
           </a:p>
@@ -1871,7 +1928,7 @@
           <a:p>
             <a:fld id="{A067E4C3-9D56-154E-B9F0-7500D37D0D92}" type="datetimeFigureOut">
               <a:rPr lang="en-US" smtClean="0"/>
-              <a:t>8/30/25</a:t>
+              <a:t>8/31/25</a:t>
             </a:fld>
             <a:endParaRPr lang="en-US"/>
           </a:p>
@@ -2012,7 +2069,7 @@
           <a:p>
             <a:fld id="{A067E4C3-9D56-154E-B9F0-7500D37D0D92}" type="datetimeFigureOut">
               <a:rPr lang="en-US" smtClean="0"/>
-              <a:t>8/30/25</a:t>
+              <a:t>8/31/25</a:t>
             </a:fld>
             <a:endParaRPr lang="en-US"/>
           </a:p>
@@ -2125,7 +2182,7 @@
           <a:p>
             <a:fld id="{A067E4C3-9D56-154E-B9F0-7500D37D0D92}" type="datetimeFigureOut">
               <a:rPr lang="en-US" smtClean="0"/>
-              <a:t>8/30/25</a:t>
+              <a:t>8/31/25</a:t>
             </a:fld>
             <a:endParaRPr lang="en-US"/>
           </a:p>
@@ -2436,7 +2493,7 @@
           <a:p>
             <a:fld id="{A067E4C3-9D56-154E-B9F0-7500D37D0D92}" type="datetimeFigureOut">
               <a:rPr lang="en-US" smtClean="0"/>
-              <a:t>8/30/25</a:t>
+              <a:t>8/31/25</a:t>
             </a:fld>
             <a:endParaRPr lang="en-US"/>
           </a:p>
@@ -2724,7 +2781,7 @@
           <a:p>
             <a:fld id="{A067E4C3-9D56-154E-B9F0-7500D37D0D92}" type="datetimeFigureOut">
               <a:rPr lang="en-US" smtClean="0"/>
-              <a:t>8/30/25</a:t>
+              <a:t>8/31/25</a:t>
             </a:fld>
             <a:endParaRPr lang="en-US"/>
           </a:p>
@@ -2965,7 +3022,7 @@
           <a:p>
             <a:fld id="{A067E4C3-9D56-154E-B9F0-7500D37D0D92}" type="datetimeFigureOut">
               <a:rPr lang="en-US" smtClean="0"/>
-              <a:t>8/30/25</a:t>
+              <a:t>8/31/25</a:t>
             </a:fld>
             <a:endParaRPr lang="en-US"/>
           </a:p>
@@ -3562,6 +3619,488 @@
         <p:cNvPr id="1" name="">
           <a:extLst>
             <a:ext uri="{FF2B5EF4-FFF2-40B4-BE49-F238E27FC236}">
+              <a16:creationId xmlns:a16="http://schemas.microsoft.com/office/drawing/2014/main" id="{2E26C0E5-0AA8-AEA6-0268-DFC25EE1181F}"/>
+            </a:ext>
+          </a:extLst>
+        </p:cNvPr>
+        <p:cNvGrpSpPr/>
+        <p:nvPr/>
+      </p:nvGrpSpPr>
+      <p:grpSpPr>
+        <a:xfrm>
+          <a:off x="0" y="0"/>
+          <a:ext cx="0" cy="0"/>
+          <a:chOff x="0" y="0"/>
+          <a:chExt cx="0" cy="0"/>
+        </a:xfrm>
+      </p:grpSpPr>
+      <p:grpSp>
+        <p:nvGrpSpPr>
+          <p:cNvPr id="39" name="Group 38">
+            <a:extLst>
+              <a:ext uri="{FF2B5EF4-FFF2-40B4-BE49-F238E27FC236}">
+                <a16:creationId xmlns:a16="http://schemas.microsoft.com/office/drawing/2014/main" id="{43C2EE4D-274D-C63F-94BE-269389611359}"/>
+              </a:ext>
+            </a:extLst>
+          </p:cNvPr>
+          <p:cNvGrpSpPr/>
+          <p:nvPr/>
+        </p:nvGrpSpPr>
+        <p:grpSpPr>
+          <a:xfrm>
+            <a:off x="4264694" y="1597694"/>
+            <a:ext cx="3662611" cy="3662611"/>
+            <a:chOff x="4264694" y="1597694"/>
+            <a:chExt cx="3662611" cy="3662611"/>
+          </a:xfrm>
+        </p:grpSpPr>
+        <mc:AlternateContent xmlns:mc="http://schemas.openxmlformats.org/markup-compatibility/2006" xmlns:p14="http://schemas.microsoft.com/office/powerpoint/2010/main">
+          <mc:Choice Requires="p14">
+            <p:contentPart p14:bwMode="auto" r:id="rId2">
+              <p14:nvContentPartPr>
+                <p14:cNvPr id="7" name="Ink 6">
+                  <a:extLst>
+                    <a:ext uri="{FF2B5EF4-FFF2-40B4-BE49-F238E27FC236}">
+                      <a16:creationId xmlns:a16="http://schemas.microsoft.com/office/drawing/2014/main" id="{2048C86E-16BE-D42D-FD87-1775397DE32E}"/>
+                    </a:ext>
+                  </a:extLst>
+                </p14:cNvPr>
+                <p14:cNvContentPartPr/>
+                <p14:nvPr/>
+              </p14:nvContentPartPr>
+              <p14:xfrm>
+                <a:off x="6872863" y="3235222"/>
+                <a:ext cx="360" cy="360"/>
+              </p14:xfrm>
+            </p:contentPart>
+          </mc:Choice>
+          <mc:Fallback xmlns="">
+            <p:pic>
+              <p:nvPicPr>
+                <p:cNvPr id="7" name="Ink 6">
+                  <a:extLst>
+                    <a:ext uri="{FF2B5EF4-FFF2-40B4-BE49-F238E27FC236}">
+                      <a16:creationId xmlns:a16="http://schemas.microsoft.com/office/drawing/2014/main" id="{C98E0644-90BE-28E8-FB2A-C91321418FB1}"/>
+                    </a:ext>
+                  </a:extLst>
+                </p:cNvPr>
+                <p:cNvPicPr/>
+                <p:nvPr/>
+              </p:nvPicPr>
+              <p:blipFill>
+                <a:blip r:embed="rId3"/>
+                <a:stretch>
+                  <a:fillRect/>
+                </a:stretch>
+              </p:blipFill>
+              <p:spPr>
+                <a:xfrm>
+                  <a:off x="6863863" y="3226222"/>
+                  <a:ext cx="18000" cy="18000"/>
+                </a:xfrm>
+                <a:prstGeom prst="rect">
+                  <a:avLst/>
+                </a:prstGeom>
+              </p:spPr>
+            </p:pic>
+          </mc:Fallback>
+        </mc:AlternateContent>
+        <p:sp>
+          <p:nvSpPr>
+            <p:cNvPr id="38" name="Rounded Rectangle 37">
+              <a:extLst>
+                <a:ext uri="{FF2B5EF4-FFF2-40B4-BE49-F238E27FC236}">
+                  <a16:creationId xmlns:a16="http://schemas.microsoft.com/office/drawing/2014/main" id="{E210B99D-8677-8D49-7C65-30674586E86E}"/>
+                </a:ext>
+              </a:extLst>
+            </p:cNvPr>
+            <p:cNvSpPr>
+              <a:spLocks noChangeAspect="1"/>
+            </p:cNvSpPr>
+            <p:nvPr/>
+          </p:nvSpPr>
+          <p:spPr>
+            <a:xfrm>
+              <a:off x="4264694" y="1597694"/>
+              <a:ext cx="3662611" cy="3662611"/>
+            </a:xfrm>
+            <a:prstGeom prst="roundRect">
+              <a:avLst/>
+            </a:prstGeom>
+            <a:solidFill>
+              <a:schemeClr val="bg1"/>
+            </a:solidFill>
+            <a:ln w="25400">
+              <a:solidFill>
+                <a:schemeClr val="tx1"/>
+              </a:solidFill>
+            </a:ln>
+          </p:spPr>
+          <p:style>
+            <a:lnRef idx="2">
+              <a:schemeClr val="accent1">
+                <a:shade val="15000"/>
+              </a:schemeClr>
+            </a:lnRef>
+            <a:fillRef idx="1">
+              <a:schemeClr val="accent1"/>
+            </a:fillRef>
+            <a:effectRef idx="0">
+              <a:schemeClr val="accent1"/>
+            </a:effectRef>
+            <a:fontRef idx="minor">
+              <a:schemeClr val="lt1"/>
+            </a:fontRef>
+          </p:style>
+          <p:txBody>
+            <a:bodyPr rtlCol="0" anchor="ctr"/>
+            <a:lstStyle/>
+            <a:p>
+              <a:pPr algn="ctr"/>
+              <a:endParaRPr lang="en-US" dirty="0"/>
+            </a:p>
+          </p:txBody>
+        </p:sp>
+      </p:grpSp>
+      <p:pic>
+        <p:nvPicPr>
+          <p:cNvPr id="3" name="Picture 2" descr="A blue and white dragonfly&#10;&#10;AI-generated content may be incorrect.">
+            <a:extLst>
+              <a:ext uri="{FF2B5EF4-FFF2-40B4-BE49-F238E27FC236}">
+                <a16:creationId xmlns:a16="http://schemas.microsoft.com/office/drawing/2014/main" id="{E2A277AA-0BB6-6FCA-AF5E-A6181FC38CA8}"/>
+              </a:ext>
+            </a:extLst>
+          </p:cNvPr>
+          <p:cNvPicPr>
+            <a:picLocks noChangeAspect="1"/>
+          </p:cNvPicPr>
+          <p:nvPr/>
+        </p:nvPicPr>
+        <p:blipFill>
+          <a:blip r:embed="rId4"/>
+          <a:srcRect l="2214" t="5686" b="15211"/>
+          <a:stretch>
+            <a:fillRect/>
+          </a:stretch>
+        </p:blipFill>
+        <p:spPr>
+          <a:xfrm>
+            <a:off x="4311278" y="2005566"/>
+            <a:ext cx="3616027" cy="2459311"/>
+          </a:xfrm>
+          <a:prstGeom prst="rect">
+            <a:avLst/>
+          </a:prstGeom>
+        </p:spPr>
+      </p:pic>
+    </p:spTree>
+    <p:extLst>
+      <p:ext uri="{BB962C8B-B14F-4D97-AF65-F5344CB8AC3E}">
+        <p14:creationId xmlns:p14="http://schemas.microsoft.com/office/powerpoint/2010/main" val="2646996123"/>
+      </p:ext>
+    </p:extLst>
+  </p:cSld>
+  <p:clrMapOvr>
+    <a:masterClrMapping/>
+  </p:clrMapOvr>
+</p:sld>
+</file>
+
+<file path=ppt/slides/slide3.xml><?xml version="1.0" encoding="utf-8"?>
+<p:sld xmlns:a="http://schemas.openxmlformats.org/drawingml/2006/main" xmlns:r="http://schemas.openxmlformats.org/officeDocument/2006/relationships" xmlns:p="http://schemas.openxmlformats.org/presentationml/2006/main">
+  <p:cSld>
+    <p:spTree>
+      <p:nvGrpSpPr>
+        <p:cNvPr id="1" name="">
+          <a:extLst>
+            <a:ext uri="{FF2B5EF4-FFF2-40B4-BE49-F238E27FC236}">
+              <a16:creationId xmlns:a16="http://schemas.microsoft.com/office/drawing/2014/main" id="{7A61368E-53B2-2828-84B2-19B0F4574C66}"/>
+            </a:ext>
+          </a:extLst>
+        </p:cNvPr>
+        <p:cNvGrpSpPr/>
+        <p:nvPr/>
+      </p:nvGrpSpPr>
+      <p:grpSpPr>
+        <a:xfrm>
+          <a:off x="0" y="0"/>
+          <a:ext cx="0" cy="0"/>
+          <a:chOff x="0" y="0"/>
+          <a:chExt cx="0" cy="0"/>
+        </a:xfrm>
+      </p:grpSpPr>
+      <p:grpSp>
+        <p:nvGrpSpPr>
+          <p:cNvPr id="5" name="Group 4">
+            <a:extLst>
+              <a:ext uri="{FF2B5EF4-FFF2-40B4-BE49-F238E27FC236}">
+                <a16:creationId xmlns:a16="http://schemas.microsoft.com/office/drawing/2014/main" id="{C2160C29-1527-D70A-8516-9342FE513B2D}"/>
+              </a:ext>
+            </a:extLst>
+          </p:cNvPr>
+          <p:cNvGrpSpPr/>
+          <p:nvPr/>
+        </p:nvGrpSpPr>
+        <p:grpSpPr>
+          <a:xfrm>
+            <a:off x="4264694" y="1597694"/>
+            <a:ext cx="3662611" cy="3662611"/>
+            <a:chOff x="4264694" y="1597694"/>
+            <a:chExt cx="3662611" cy="3662611"/>
+          </a:xfrm>
+        </p:grpSpPr>
+        <p:grpSp>
+          <p:nvGrpSpPr>
+            <p:cNvPr id="39" name="Group 38">
+              <a:extLst>
+                <a:ext uri="{FF2B5EF4-FFF2-40B4-BE49-F238E27FC236}">
+                  <a16:creationId xmlns:a16="http://schemas.microsoft.com/office/drawing/2014/main" id="{A3B7F66A-DAF8-8122-5985-1F0DB8FC976C}"/>
+                </a:ext>
+              </a:extLst>
+            </p:cNvPr>
+            <p:cNvGrpSpPr/>
+            <p:nvPr/>
+          </p:nvGrpSpPr>
+          <p:grpSpPr>
+            <a:xfrm>
+              <a:off x="4264694" y="1597694"/>
+              <a:ext cx="3662611" cy="3662611"/>
+              <a:chOff x="4264694" y="1597694"/>
+              <a:chExt cx="3662611" cy="3662611"/>
+            </a:xfrm>
+          </p:grpSpPr>
+          <mc:AlternateContent xmlns:mc="http://schemas.openxmlformats.org/markup-compatibility/2006" xmlns:p14="http://schemas.microsoft.com/office/powerpoint/2010/main">
+            <mc:Choice Requires="p14">
+              <p:contentPart p14:bwMode="auto" r:id="rId2">
+                <p14:nvContentPartPr>
+                  <p14:cNvPr id="7" name="Ink 6">
+                    <a:extLst>
+                      <a:ext uri="{FF2B5EF4-FFF2-40B4-BE49-F238E27FC236}">
+                        <a16:creationId xmlns:a16="http://schemas.microsoft.com/office/drawing/2014/main" id="{53262732-23FF-55E8-A6DF-BA1B96C35A39}"/>
+                      </a:ext>
+                    </a:extLst>
+                  </p14:cNvPr>
+                  <p14:cNvContentPartPr/>
+                  <p14:nvPr/>
+                </p14:nvContentPartPr>
+                <p14:xfrm>
+                  <a:off x="6872863" y="3235222"/>
+                  <a:ext cx="360" cy="360"/>
+                </p14:xfrm>
+              </p:contentPart>
+            </mc:Choice>
+            <mc:Fallback xmlns="">
+              <p:pic>
+                <p:nvPicPr>
+                  <p:cNvPr id="7" name="Ink 6">
+                    <a:extLst>
+                      <a:ext uri="{FF2B5EF4-FFF2-40B4-BE49-F238E27FC236}">
+                        <a16:creationId xmlns:a16="http://schemas.microsoft.com/office/drawing/2014/main" id="{C98E0644-90BE-28E8-FB2A-C91321418FB1}"/>
+                      </a:ext>
+                    </a:extLst>
+                  </p:cNvPr>
+                  <p:cNvPicPr/>
+                  <p:nvPr/>
+                </p:nvPicPr>
+                <p:blipFill>
+                  <a:blip r:embed="rId3"/>
+                  <a:stretch>
+                    <a:fillRect/>
+                  </a:stretch>
+                </p:blipFill>
+                <p:spPr>
+                  <a:xfrm>
+                    <a:off x="6863863" y="3226222"/>
+                    <a:ext cx="18000" cy="18000"/>
+                  </a:xfrm>
+                  <a:prstGeom prst="rect">
+                    <a:avLst/>
+                  </a:prstGeom>
+                </p:spPr>
+              </p:pic>
+            </mc:Fallback>
+          </mc:AlternateContent>
+          <p:sp>
+            <p:nvSpPr>
+              <p:cNvPr id="38" name="Rounded Rectangle 37">
+                <a:extLst>
+                  <a:ext uri="{FF2B5EF4-FFF2-40B4-BE49-F238E27FC236}">
+                    <a16:creationId xmlns:a16="http://schemas.microsoft.com/office/drawing/2014/main" id="{30EF529A-867E-3273-B923-0F4B8C0CE57D}"/>
+                  </a:ext>
+                </a:extLst>
+              </p:cNvPr>
+              <p:cNvSpPr>
+                <a:spLocks noChangeAspect="1"/>
+              </p:cNvSpPr>
+              <p:nvPr/>
+            </p:nvSpPr>
+            <p:spPr>
+              <a:xfrm>
+                <a:off x="4264694" y="1597694"/>
+                <a:ext cx="3662611" cy="3662611"/>
+              </a:xfrm>
+              <a:prstGeom prst="roundRect">
+                <a:avLst/>
+              </a:prstGeom>
+              <a:solidFill>
+                <a:schemeClr val="bg1"/>
+              </a:solidFill>
+              <a:ln w="25400">
+                <a:noFill/>
+              </a:ln>
+            </p:spPr>
+            <p:style>
+              <a:lnRef idx="2">
+                <a:schemeClr val="accent1">
+                  <a:shade val="15000"/>
+                </a:schemeClr>
+              </a:lnRef>
+              <a:fillRef idx="1">
+                <a:schemeClr val="accent1"/>
+              </a:fillRef>
+              <a:effectRef idx="0">
+                <a:schemeClr val="accent1"/>
+              </a:effectRef>
+              <a:fontRef idx="minor">
+                <a:schemeClr val="lt1"/>
+              </a:fontRef>
+            </p:style>
+            <p:txBody>
+              <a:bodyPr rtlCol="0" anchor="ctr"/>
+              <a:lstStyle/>
+              <a:p>
+                <a:pPr algn="ctr"/>
+                <a:endParaRPr lang="en-US" dirty="0"/>
+              </a:p>
+            </p:txBody>
+          </p:sp>
+        </p:grpSp>
+        <p:pic>
+          <p:nvPicPr>
+            <p:cNvPr id="4" name="Picture 3" descr="A blue and white dragonfly&#10;&#10;AI-generated content may be incorrect.">
+              <a:extLst>
+                <a:ext uri="{FF2B5EF4-FFF2-40B4-BE49-F238E27FC236}">
+                  <a16:creationId xmlns:a16="http://schemas.microsoft.com/office/drawing/2014/main" id="{5F066244-AF3E-8703-E36D-B8A43F0C238F}"/>
+                </a:ext>
+              </a:extLst>
+            </p:cNvPr>
+            <p:cNvPicPr>
+              <a:picLocks noChangeAspect="1"/>
+            </p:cNvPicPr>
+            <p:nvPr/>
+          </p:nvPicPr>
+          <p:blipFill>
+            <a:blip r:embed="rId4">
+              <a:extLst>
+                <a:ext uri="{BEBA8EAE-BF5A-486C-A8C5-ECC9F3942E4B}">
+                  <a14:imgProps xmlns:a14="http://schemas.microsoft.com/office/drawing/2010/main">
+                    <a14:imgLayer r:embed="rId5">
+                      <a14:imgEffect>
+                        <a14:brightnessContrast bright="-20000" contrast="20000"/>
+                      </a14:imgEffect>
+                    </a14:imgLayer>
+                  </a14:imgProps>
+                </a:ext>
+              </a:extLst>
+            </a:blip>
+            <a:srcRect l="665" t="8489" b="22071"/>
+            <a:stretch>
+              <a:fillRect/>
+            </a:stretch>
+          </p:blipFill>
+          <p:spPr>
+            <a:xfrm>
+              <a:off x="4319272" y="2384777"/>
+              <a:ext cx="3553453" cy="2088444"/>
+            </a:xfrm>
+            <a:prstGeom prst="rect">
+              <a:avLst/>
+            </a:prstGeom>
+          </p:spPr>
+        </p:pic>
+      </p:grpSp>
+    </p:spTree>
+    <p:extLst>
+      <p:ext uri="{BB962C8B-B14F-4D97-AF65-F5344CB8AC3E}">
+        <p14:creationId xmlns:p14="http://schemas.microsoft.com/office/powerpoint/2010/main" val="1012188927"/>
+      </p:ext>
+    </p:extLst>
+  </p:cSld>
+  <p:clrMapOvr>
+    <a:masterClrMapping/>
+  </p:clrMapOvr>
+</p:sld>
+</file>
+
+<file path=ppt/slides/slide4.xml><?xml version="1.0" encoding="utf-8"?>
+<p:sld xmlns:a="http://schemas.openxmlformats.org/drawingml/2006/main" xmlns:r="http://schemas.openxmlformats.org/officeDocument/2006/relationships" xmlns:p="http://schemas.openxmlformats.org/presentationml/2006/main">
+  <p:cSld>
+    <p:spTree>
+      <p:nvGrpSpPr>
+        <p:cNvPr id="1" name=""/>
+        <p:cNvGrpSpPr/>
+        <p:nvPr/>
+      </p:nvGrpSpPr>
+      <p:grpSpPr>
+        <a:xfrm>
+          <a:off x="0" y="0"/>
+          <a:ext cx="0" cy="0"/>
+          <a:chOff x="0" y="0"/>
+          <a:chExt cx="0" cy="0"/>
+        </a:xfrm>
+      </p:grpSpPr>
+      <p:pic>
+        <p:nvPicPr>
+          <p:cNvPr id="2" name="Picture 1" descr="A blue and white dragonfly&#10;&#10;AI-generated content may be incorrect.">
+            <a:extLst>
+              <a:ext uri="{FF2B5EF4-FFF2-40B4-BE49-F238E27FC236}">
+                <a16:creationId xmlns:a16="http://schemas.microsoft.com/office/drawing/2014/main" id="{FCBF827A-504F-D3B6-FDCE-2CD161E0BE46}"/>
+              </a:ext>
+            </a:extLst>
+          </p:cNvPr>
+          <p:cNvPicPr>
+            <a:picLocks noChangeAspect="1"/>
+          </p:cNvPicPr>
+          <p:nvPr/>
+        </p:nvPicPr>
+        <p:blipFill>
+          <a:blip r:embed="rId2"/>
+          <a:srcRect l="43710" t="11225" r="43010" b="73284"/>
+          <a:stretch>
+            <a:fillRect/>
+          </a:stretch>
+        </p:blipFill>
+        <p:spPr>
+          <a:xfrm>
+            <a:off x="5141526" y="2268201"/>
+            <a:ext cx="1908948" cy="1871999"/>
+          </a:xfrm>
+          <a:prstGeom prst="ellipse">
+            <a:avLst/>
+          </a:prstGeom>
+        </p:spPr>
+      </p:pic>
+    </p:spTree>
+    <p:extLst>
+      <p:ext uri="{BB962C8B-B14F-4D97-AF65-F5344CB8AC3E}">
+        <p14:creationId xmlns:p14="http://schemas.microsoft.com/office/powerpoint/2010/main" val="1674629754"/>
+      </p:ext>
+    </p:extLst>
+  </p:cSld>
+  <p:clrMapOvr>
+    <a:masterClrMapping/>
+  </p:clrMapOvr>
+</p:sld>
+</file>
+
+<file path=ppt/slides/slide5.xml><?xml version="1.0" encoding="utf-8"?>
+<p:sld xmlns:a="http://schemas.openxmlformats.org/drawingml/2006/main" xmlns:r="http://schemas.openxmlformats.org/officeDocument/2006/relationships" xmlns:p="http://schemas.openxmlformats.org/presentationml/2006/main">
+  <p:cSld>
+    <p:spTree>
+      <p:nvGrpSpPr>
+        <p:cNvPr id="1" name="">
+          <a:extLst>
+            <a:ext uri="{FF2B5EF4-FFF2-40B4-BE49-F238E27FC236}">
               <a16:creationId xmlns:a16="http://schemas.microsoft.com/office/drawing/2014/main" id="{194CAA66-3C8E-89DD-5F23-9CACBB5E06F2}"/>
             </a:ext>
           </a:extLst>
@@ -3749,7 +4288,7 @@
 </p:sld>
 </file>
 
-<file path=ppt/slides/slide3.xml><?xml version="1.0" encoding="utf-8"?>
+<file path=ppt/slides/slide6.xml><?xml version="1.0" encoding="utf-8"?>
 <p:sld xmlns:a="http://schemas.openxmlformats.org/drawingml/2006/main" xmlns:r="http://schemas.openxmlformats.org/officeDocument/2006/relationships" xmlns:p="http://schemas.openxmlformats.org/presentationml/2006/main">
   <p:cSld>
     <p:spTree>

</xml_diff>